<commit_message>
Add hands-on materials (excersices & solutions)
</commit_message>
<xml_diff>
--- a/ISTA.pptx
+++ b/ISTA.pptx
@@ -5,7 +5,7 @@
     <p:sldMasterId id="2147483648" r:id="rId1"/>
   </p:sldMasterIdLst>
   <p:notesMasterIdLst>
-    <p:notesMasterId r:id="rId19"/>
+    <p:notesMasterId r:id="rId20"/>
   </p:notesMasterIdLst>
   <p:sldIdLst>
     <p:sldId id="256" r:id="rId2"/>
@@ -23,25 +23,26 @@
     <p:sldId id="295" r:id="rId14"/>
     <p:sldId id="306" r:id="rId15"/>
     <p:sldId id="297" r:id="rId16"/>
-    <p:sldId id="304" r:id="rId17"/>
+    <p:sldId id="307" r:id="rId17"/>
     <p:sldId id="303" r:id="rId18"/>
+    <p:sldId id="308" r:id="rId19"/>
   </p:sldIdLst>
   <p:sldSz cx="9144000" cy="6858000" type="screen4x3"/>
   <p:notesSz cx="6858000" cy="9144000"/>
   <p:embeddedFontLst>
     <p:embeddedFont>
       <p:font typeface="Century Schoolbook" panose="02040604050505020304" pitchFamily="18" charset="0"/>
-      <p:regular r:id="rId20"/>
-      <p:bold r:id="rId21"/>
-      <p:italic r:id="rId22"/>
-      <p:boldItalic r:id="rId23"/>
+      <p:regular r:id="rId21"/>
+      <p:bold r:id="rId22"/>
+      <p:italic r:id="rId23"/>
+      <p:boldItalic r:id="rId24"/>
     </p:embeddedFont>
     <p:embeddedFont>
       <p:font typeface="Calibri" panose="020F0502020204030204" pitchFamily="34" charset="0"/>
-      <p:regular r:id="rId24"/>
-      <p:bold r:id="rId25"/>
-      <p:italic r:id="rId26"/>
-      <p:boldItalic r:id="rId27"/>
+      <p:regular r:id="rId25"/>
+      <p:bold r:id="rId26"/>
+      <p:italic r:id="rId27"/>
+      <p:boldItalic r:id="rId28"/>
     </p:embeddedFont>
   </p:embeddedFontLst>
   <p:defaultTextStyle>
@@ -224,7 +225,7 @@
           <a:p>
             <a:fld id="{549A8584-3EC9-4B3D-ADEC-484F38C8C612}" type="datetimeFigureOut">
               <a:rPr lang="en-GB" smtClean="0"/>
-              <a:t>17/11/2014</a:t>
+              <a:t>24/11/2014</a:t>
             </a:fld>
             <a:endParaRPr lang="en-GB"/>
           </a:p>
@@ -1207,19 +1208,11 @@
             </a:r>
             <a:r>
               <a:rPr lang="en-US" dirty="0" smtClean="0"/>
-              <a:t> - Dependency Injection, Argument </a:t>
-            </a:r>
-            <a:r>
-              <a:rPr lang="en-US" dirty="0" err="1" smtClean="0"/>
-              <a:t>Primitivisation</a:t>
-            </a:r>
-            <a:r>
-              <a:rPr lang="en-US" dirty="0" smtClean="0"/>
-              <a:t>, Stubbs</a:t>
+              <a:t> – we’ll see</a:t>
             </a:r>
             <a:r>
               <a:rPr lang="en-US" baseline="0" dirty="0" smtClean="0"/>
-              <a:t> &amp; Mocks</a:t>
+              <a:t> them later</a:t>
             </a:r>
           </a:p>
           <a:p>
@@ -1239,24 +1232,6 @@
           <a:p>
             <a:r>
               <a:rPr lang="en-US" baseline="0" dirty="0" smtClean="0"/>
-              <a:t>	If a unit </a:t>
-            </a:r>
-            <a:r>
-              <a:rPr lang="en-US" b="1" baseline="0" dirty="0" smtClean="0"/>
-              <a:t>cannot be easily isolated</a:t>
-            </a:r>
-            <a:r>
-              <a:rPr lang="en-US" baseline="0" dirty="0" smtClean="0"/>
-              <a:t> test the </a:t>
-            </a:r>
-            <a:r>
-              <a:rPr lang="en-US" b="1" baseline="0" dirty="0" smtClean="0"/>
-              <a:t>smallest possible system of units</a:t>
-            </a:r>
-          </a:p>
-          <a:p>
-            <a:r>
-              <a:rPr lang="en-US" baseline="0" dirty="0" smtClean="0"/>
               <a:t>	Make </a:t>
             </a:r>
             <a:r>
@@ -1334,37 +1309,14 @@
           </a:p>
           <a:p>
             <a:r>
-              <a:rPr lang="en-US" b="0" baseline="0" dirty="0" smtClean="0"/>
-              <a:t>	It can adapt the design so that the new feature will be easier to implement</a:t>
-            </a:r>
-            <a:endParaRPr lang="en-US" b="1" baseline="0" dirty="0" smtClean="0"/>
-          </a:p>
-          <a:p>
-            <a:r>
               <a:rPr lang="en-US" b="1" dirty="0" smtClean="0"/>
               <a:t>Add new features</a:t>
             </a:r>
           </a:p>
           <a:p>
             <a:r>
-              <a:rPr lang="en-US" dirty="0" smtClean="0"/>
-              <a:t>	Write</a:t>
-            </a:r>
-            <a:r>
               <a:rPr lang="en-US" baseline="0" dirty="0" smtClean="0"/>
-              <a:t> a test for the new feature before the code</a:t>
-            </a:r>
-          </a:p>
-          <a:p>
-            <a:r>
-              <a:rPr lang="en-US" b="0" baseline="0" dirty="0" smtClean="0"/>
-              <a:t>	Make sure that the new test fails</a:t>
-            </a:r>
-          </a:p>
-          <a:p>
-            <a:r>
-              <a:rPr lang="en-US" b="0" baseline="0" dirty="0" smtClean="0"/>
-              <a:t>	Step by step add code that implements the feature until tests run green</a:t>
+              <a:t>	TDD</a:t>
             </a:r>
           </a:p>
           <a:p>
@@ -1375,43 +1327,8 @@
           </a:p>
           <a:p>
             <a:r>
-              <a:rPr lang="en-US" b="0" baseline="0" dirty="0" smtClean="0"/>
-              <a:t>	Execute tests after each small change, so that you know you didn’t break anything</a:t>
-            </a:r>
-          </a:p>
-          <a:p>
-            <a:r>
               <a:rPr lang="en-US" b="1" baseline="0" dirty="0" smtClean="0"/>
               <a:t>Scope Of Testing: Do you have to put the whole system into a harness in one go?</a:t>
-            </a:r>
-          </a:p>
-          <a:p>
-            <a:r>
-              <a:rPr lang="en-US" b="1" baseline="0" dirty="0" smtClean="0"/>
-              <a:t>	</a:t>
-            </a:r>
-            <a:r>
-              <a:rPr lang="en-US" b="0" baseline="0" dirty="0" smtClean="0"/>
-              <a:t>Change is usually feature driven</a:t>
-            </a:r>
-          </a:p>
-          <a:p>
-            <a:r>
-              <a:rPr lang="en-US" b="0" baseline="0" dirty="0" smtClean="0"/>
-              <a:t>	Identify the change points of what you are trying to do</a:t>
-            </a:r>
-          </a:p>
-          <a:p>
-            <a:r>
-              <a:rPr lang="en-US" b="0" baseline="0" dirty="0" smtClean="0"/>
-              <a:t>	Test the system around the change points</a:t>
-            </a:r>
-            <a:endParaRPr lang="en-US" b="1" baseline="0" dirty="0" smtClean="0"/>
-          </a:p>
-          <a:p>
-            <a:r>
-              <a:rPr lang="en-US" b="0" baseline="0" dirty="0" smtClean="0"/>
-              <a:t>	Add new feature with tests</a:t>
             </a:r>
           </a:p>
           <a:p>
@@ -1528,53 +1445,35 @@
             </a:r>
           </a:p>
           <a:p>
-            <a:endParaRPr lang="en-US" dirty="0" smtClean="0"/>
-          </a:p>
-          <a:p>
-            <a:r>
-              <a:rPr lang="en-US" dirty="0" smtClean="0"/>
-              <a:t>Tests</a:t>
-            </a:r>
-          </a:p>
-          <a:p>
-            <a:r>
-              <a:rPr lang="en-US" dirty="0" smtClean="0"/>
-              <a:t>	will guarantee we do</a:t>
-            </a:r>
-            <a:r>
-              <a:rPr lang="en-US" baseline="0" dirty="0" smtClean="0"/>
-              <a:t> not break code</a:t>
-            </a:r>
-          </a:p>
-          <a:p>
-            <a:r>
-              <a:rPr lang="en-US" baseline="0" dirty="0" smtClean="0"/>
-              <a:t>	enable change</a:t>
-            </a:r>
-            <a:endParaRPr lang="en-US" dirty="0" smtClean="0"/>
-          </a:p>
-          <a:p>
-            <a:r>
-              <a:rPr lang="en-US" dirty="0" smtClean="0"/>
-              <a:t>No code changes or bug fixes</a:t>
-            </a:r>
-          </a:p>
-          <a:p>
-            <a:r>
-              <a:rPr lang="en-US" dirty="0" smtClean="0"/>
-              <a:t>	bugs are part of the API - customers rely on it</a:t>
-            </a:r>
-          </a:p>
-          <a:p>
-            <a:r>
-              <a:rPr lang="en-US" dirty="0" smtClean="0"/>
-              <a:t>	we have no tests yet – cannot guarantee we don’t</a:t>
-            </a:r>
-            <a:r>
-              <a:rPr lang="en-US" baseline="0" dirty="0" smtClean="0"/>
-              <a:t> break code</a:t>
-            </a:r>
-            <a:endParaRPr lang="en-GB" dirty="0"/>
+            <a:endParaRPr lang="en-US" b="1" dirty="0" smtClean="0"/>
+          </a:p>
+          <a:p>
+            <a:r>
+              <a:rPr lang="en-US" b="0" dirty="0" smtClean="0"/>
+              <a:t>Computer system (Cache Register)</a:t>
+            </a:r>
+            <a:r>
+              <a:rPr lang="en-US" b="0" baseline="0" dirty="0" smtClean="0"/>
+              <a:t> </a:t>
+            </a:r>
+            <a:r>
+              <a:rPr lang="en-US" b="0" dirty="0" smtClean="0"/>
+              <a:t>with fiscal device</a:t>
+            </a:r>
+          </a:p>
+          <a:p>
+            <a:endParaRPr lang="bg-BG" dirty="0" smtClean="0"/>
+          </a:p>
+          <a:p>
+            <a:r>
+              <a:rPr lang="bg-BG" b="1" dirty="0" smtClean="0"/>
+              <a:t>Компютърна</a:t>
+            </a:r>
+            <a:r>
+              <a:rPr lang="bg-BG" b="1" baseline="0" dirty="0" smtClean="0"/>
+              <a:t> система вързана с фискално устройство</a:t>
+            </a:r>
+            <a:endParaRPr lang="en-US" b="1" dirty="0" smtClean="0"/>
           </a:p>
         </p:txBody>
       </p:sp>
@@ -1967,6 +1866,33 @@
               <a:t>(Georgi)</a:t>
             </a:r>
           </a:p>
+          <a:p>
+            <a:endParaRPr lang="en-US" b="1" dirty="0" smtClean="0"/>
+          </a:p>
+          <a:p>
+            <a:r>
+              <a:rPr lang="en-US" b="1" dirty="0" smtClean="0"/>
+              <a:t>If there is time – explain briefly</a:t>
+            </a:r>
+            <a:r>
+              <a:rPr lang="en-US" b="1" baseline="0" dirty="0" smtClean="0"/>
+              <a:t> </a:t>
+            </a:r>
+            <a:r>
+              <a:rPr lang="en-US" b="1" dirty="0" smtClean="0"/>
+              <a:t>the changes</a:t>
+            </a:r>
+          </a:p>
+          <a:p>
+            <a:endParaRPr lang="en-US" b="1" dirty="0" smtClean="0"/>
+          </a:p>
+          <a:p>
+            <a:r>
+              <a:rPr lang="en-US" b="1" dirty="0" smtClean="0"/>
+              <a:t>If no time – just point out the link</a:t>
+            </a:r>
+            <a:endParaRPr lang="en-US" b="1" dirty="0"/>
+          </a:p>
         </p:txBody>
       </p:sp>
       <p:sp>
@@ -1995,7 +1921,7 @@
     </p:spTree>
     <p:extLst>
       <p:ext uri="{BB962C8B-B14F-4D97-AF65-F5344CB8AC3E}">
-        <p14:creationId xmlns:p14="http://schemas.microsoft.com/office/powerpoint/2010/main" val="986517499"/>
+        <p14:creationId xmlns:p14="http://schemas.microsoft.com/office/powerpoint/2010/main" val="3300127822"/>
       </p:ext>
     </p:extLst>
   </p:cSld>
@@ -2353,11 +2279,7 @@
             </a:r>
             <a:r>
               <a:rPr lang="en-US" b="0" baseline="0" dirty="0" smtClean="0"/>
-              <a:t> scenarios are </a:t>
-            </a:r>
-            <a:r>
-              <a:rPr lang="en-US" b="0" baseline="0" dirty="0" smtClean="0"/>
-              <a:t>complex</a:t>
+              <a:t> scenarios are complex</a:t>
             </a:r>
           </a:p>
           <a:p>
@@ -3155,30 +3077,53 @@
           <a:bodyPr/>
           <a:lstStyle/>
           <a:p>
-            <a:pPr marL="0" marR="0" indent="0" algn="l" defTabSz="914400" rtl="0" eaLnBrk="1" fontAlgn="auto" latinLnBrk="0" hangingPunct="1">
-              <a:lnSpc>
-                <a:spcPct val="100000"/>
-              </a:lnSpc>
-              <a:spcBef>
-                <a:spcPts val="0"/>
-              </a:spcBef>
-              <a:spcAft>
-                <a:spcPts val="0"/>
-              </a:spcAft>
-              <a:buClrTx/>
-              <a:buSzTx/>
-              <a:buFontTx/>
-              <a:buNone/>
-              <a:tabLst/>
-              <a:defRPr/>
-            </a:pPr>
             <a:r>
               <a:rPr lang="en-US" b="1" dirty="0" smtClean="0"/>
-              <a:t>(Hristo)</a:t>
-            </a:r>
-          </a:p>
-          <a:p>
-            <a:endParaRPr lang="en-US" dirty="0"/>
+              <a:t>(Georgi)</a:t>
+            </a:r>
+          </a:p>
+          <a:p>
+            <a:endParaRPr lang="en-US" b="1" dirty="0" smtClean="0"/>
+          </a:p>
+          <a:p>
+            <a:r>
+              <a:rPr lang="en-US" b="1" dirty="0" smtClean="0"/>
+              <a:t>Split</a:t>
+            </a:r>
+            <a:r>
+              <a:rPr lang="en-US" b="1" baseline="0" dirty="0" smtClean="0"/>
+              <a:t> view in Test &amp; Code</a:t>
+            </a:r>
+          </a:p>
+          <a:p>
+            <a:r>
+              <a:rPr lang="en-US" b="1" baseline="0" dirty="0" smtClean="0"/>
+              <a:t>Add test </a:t>
+            </a:r>
+            <a:r>
+              <a:rPr lang="en-US" b="1" baseline="0" dirty="0" err="1" smtClean="0"/>
+              <a:t>isEmpty</a:t>
+            </a:r>
+            <a:endParaRPr lang="en-US" b="1" baseline="0" dirty="0" smtClean="0"/>
+          </a:p>
+          <a:p>
+            <a:r>
+              <a:rPr lang="en-US" b="1" baseline="0" dirty="0" smtClean="0"/>
+              <a:t>Run test –check that it fails</a:t>
+            </a:r>
+          </a:p>
+          <a:p>
+            <a:r>
+              <a:rPr lang="en-US" b="1" baseline="0" dirty="0" smtClean="0"/>
+              <a:t>Add in size() return 0</a:t>
+            </a:r>
+          </a:p>
+          <a:p>
+            <a:r>
+              <a:rPr lang="en-US" b="1" dirty="0" smtClean="0"/>
+              <a:t>Run test – check that it passed</a:t>
+            </a:r>
+            <a:endParaRPr lang="en-US" b="1" dirty="0"/>
           </a:p>
         </p:txBody>
       </p:sp>
@@ -3506,7 +3451,7 @@
           <a:p>
             <a:fld id="{85BC1F4D-59B5-447D-A3E9-B3DA201CA772}" type="datetimeFigureOut">
               <a:rPr lang="en-GB" smtClean="0"/>
-              <a:t>17/11/2014</a:t>
+              <a:t>24/11/2014</a:t>
             </a:fld>
             <a:endParaRPr lang="en-GB"/>
           </a:p>
@@ -3676,7 +3621,7 @@
           <a:p>
             <a:fld id="{85BC1F4D-59B5-447D-A3E9-B3DA201CA772}" type="datetimeFigureOut">
               <a:rPr lang="en-GB" smtClean="0"/>
-              <a:t>17/11/2014</a:t>
+              <a:t>24/11/2014</a:t>
             </a:fld>
             <a:endParaRPr lang="en-GB"/>
           </a:p>
@@ -3856,7 +3801,7 @@
           <a:p>
             <a:fld id="{85BC1F4D-59B5-447D-A3E9-B3DA201CA772}" type="datetimeFigureOut">
               <a:rPr lang="en-GB" smtClean="0"/>
-              <a:t>17/11/2014</a:t>
+              <a:t>24/11/2014</a:t>
             </a:fld>
             <a:endParaRPr lang="en-GB"/>
           </a:p>
@@ -4026,7 +3971,7 @@
           <a:p>
             <a:fld id="{85BC1F4D-59B5-447D-A3E9-B3DA201CA772}" type="datetimeFigureOut">
               <a:rPr lang="en-GB" smtClean="0"/>
-              <a:t>17/11/2014</a:t>
+              <a:t>24/11/2014</a:t>
             </a:fld>
             <a:endParaRPr lang="en-GB"/>
           </a:p>
@@ -4272,7 +4217,7 @@
           <a:p>
             <a:fld id="{85BC1F4D-59B5-447D-A3E9-B3DA201CA772}" type="datetimeFigureOut">
               <a:rPr lang="en-GB" smtClean="0"/>
-              <a:t>17/11/2014</a:t>
+              <a:t>24/11/2014</a:t>
             </a:fld>
             <a:endParaRPr lang="en-GB"/>
           </a:p>
@@ -4560,7 +4505,7 @@
           <a:p>
             <a:fld id="{85BC1F4D-59B5-447D-A3E9-B3DA201CA772}" type="datetimeFigureOut">
               <a:rPr lang="en-GB" smtClean="0"/>
-              <a:t>17/11/2014</a:t>
+              <a:t>24/11/2014</a:t>
             </a:fld>
             <a:endParaRPr lang="en-GB"/>
           </a:p>
@@ -4982,7 +4927,7 @@
           <a:p>
             <a:fld id="{85BC1F4D-59B5-447D-A3E9-B3DA201CA772}" type="datetimeFigureOut">
               <a:rPr lang="en-GB" smtClean="0"/>
-              <a:t>17/11/2014</a:t>
+              <a:t>24/11/2014</a:t>
             </a:fld>
             <a:endParaRPr lang="en-GB"/>
           </a:p>
@@ -5100,7 +5045,7 @@
           <a:p>
             <a:fld id="{85BC1F4D-59B5-447D-A3E9-B3DA201CA772}" type="datetimeFigureOut">
               <a:rPr lang="en-GB" smtClean="0"/>
-              <a:t>17/11/2014</a:t>
+              <a:t>24/11/2014</a:t>
             </a:fld>
             <a:endParaRPr lang="en-GB"/>
           </a:p>
@@ -5195,7 +5140,7 @@
           <a:p>
             <a:fld id="{85BC1F4D-59B5-447D-A3E9-B3DA201CA772}" type="datetimeFigureOut">
               <a:rPr lang="en-GB" smtClean="0"/>
-              <a:t>17/11/2014</a:t>
+              <a:t>24/11/2014</a:t>
             </a:fld>
             <a:endParaRPr lang="en-GB"/>
           </a:p>
@@ -5472,7 +5417,7 @@
           <a:p>
             <a:fld id="{85BC1F4D-59B5-447D-A3E9-B3DA201CA772}" type="datetimeFigureOut">
               <a:rPr lang="en-GB" smtClean="0"/>
-              <a:t>17/11/2014</a:t>
+              <a:t>24/11/2014</a:t>
             </a:fld>
             <a:endParaRPr lang="en-GB"/>
           </a:p>
@@ -5725,7 +5670,7 @@
           <a:p>
             <a:fld id="{85BC1F4D-59B5-447D-A3E9-B3DA201CA772}" type="datetimeFigureOut">
               <a:rPr lang="en-GB" smtClean="0"/>
-              <a:t>17/11/2014</a:t>
+              <a:t>24/11/2014</a:t>
             </a:fld>
             <a:endParaRPr lang="en-GB"/>
           </a:p>
@@ -5938,7 +5883,7 @@
           <a:p>
             <a:fld id="{85BC1F4D-59B5-447D-A3E9-B3DA201CA772}" type="datetimeFigureOut">
               <a:rPr lang="en-GB" smtClean="0"/>
-              <a:t>17/11/2014</a:t>
+              <a:t>24/11/2014</a:t>
             </a:fld>
             <a:endParaRPr lang="en-GB"/>
           </a:p>
@@ -7073,11 +7018,7 @@
           <a:p>
             <a:r>
               <a:rPr lang="en-US" dirty="0" smtClean="0"/>
-              <a:t>Your turn … </a:t>
-            </a:r>
-            <a:r>
-              <a:rPr lang="en-US" dirty="0" smtClean="0"/>
-              <a:t>1/2</a:t>
+              <a:t>Your turn … 1/2</a:t>
             </a:r>
             <a:endParaRPr lang="en-GB" dirty="0"/>
           </a:p>
@@ -7109,7 +7050,7 @@
             <a:pPr lvl="1"/>
             <a:r>
               <a:rPr lang="en-US" dirty="0" smtClean="0"/>
-              <a:t>Capture behaviour</a:t>
+              <a:t>Write a test</a:t>
             </a:r>
           </a:p>
           <a:p>
@@ -7129,7 +7070,7 @@
             <a:pPr lvl="1"/>
             <a:r>
               <a:rPr lang="en-US" dirty="0" smtClean="0"/>
-              <a:t>Write tests</a:t>
+              <a:t>Write a test</a:t>
             </a:r>
           </a:p>
           <a:p>
@@ -7145,6 +7086,12 @@
               <a:rPr lang="en-US" dirty="0" smtClean="0"/>
               <a:t>No bug fixes</a:t>
             </a:r>
+          </a:p>
+          <a:p>
+            <a:pPr marL="914400" lvl="2" indent="0">
+              <a:buNone/>
+            </a:pPr>
+            <a:endParaRPr lang="en-US" dirty="0" smtClean="0"/>
           </a:p>
         </p:txBody>
       </p:sp>
@@ -7243,11 +7190,7 @@
           <a:p>
             <a:r>
               <a:rPr lang="en-US" dirty="0" smtClean="0"/>
-              <a:t>Your turn … </a:t>
-            </a:r>
-            <a:r>
-              <a:rPr lang="en-US" dirty="0" smtClean="0"/>
-              <a:t>2/2</a:t>
+              <a:t>Your turn … 2/2</a:t>
             </a:r>
             <a:endParaRPr lang="en-GB" dirty="0"/>
           </a:p>
@@ -7279,7 +7222,21 @@
             <a:pPr lvl="1"/>
             <a:r>
               <a:rPr lang="en-US" dirty="0" smtClean="0"/>
-              <a:t>Add new functionality</a:t>
+              <a:t>Scrap item</a:t>
+            </a:r>
+          </a:p>
+          <a:p>
+            <a:pPr lvl="2"/>
+            <a:r>
+              <a:rPr lang="en-US" dirty="0" smtClean="0"/>
+              <a:t>In stock items only</a:t>
+            </a:r>
+          </a:p>
+          <a:p>
+            <a:pPr lvl="2"/>
+            <a:r>
+              <a:rPr lang="en-US" dirty="0" smtClean="0"/>
+              <a:t>Number of scrapped</a:t>
             </a:r>
           </a:p>
           <a:p>
@@ -7413,9 +7370,50 @@
           </a:p>
         </p:txBody>
       </p:sp>
-      <p:sp>
-        <p:nvSpPr>
-          <p:cNvPr id="3" name="Content Placeholder 2"/>
+      <p:pic>
+        <p:nvPicPr>
+          <p:cNvPr id="1029" name="Picture 5" descr="C:\Users\i056003\AppData\Local\Microsoft\Windows\Temporary Internet Files\Content.IE5\MR4Z0USH\MC900434828[1].png"/>
+          <p:cNvPicPr>
+            <a:picLocks noChangeAspect="1" noChangeArrowheads="1"/>
+          </p:cNvPicPr>
+          <p:nvPr/>
+        </p:nvPicPr>
+        <p:blipFill>
+          <a:blip r:embed="rId3">
+            <a:extLst>
+              <a:ext uri="{28A0092B-C50C-407E-A947-70E740481C1C}">
+                <a14:useLocalDpi xmlns:a14="http://schemas.microsoft.com/office/drawing/2010/main" val="0"/>
+              </a:ext>
+            </a:extLst>
+          </a:blip>
+          <a:srcRect/>
+          <a:stretch>
+            <a:fillRect/>
+          </a:stretch>
+        </p:blipFill>
+        <p:spPr bwMode="auto">
+          <a:xfrm>
+            <a:off x="2484502" y="1595264"/>
+            <a:ext cx="4247738" cy="4247738"/>
+          </a:xfrm>
+          <a:prstGeom prst="rect">
+            <a:avLst/>
+          </a:prstGeom>
+          <a:noFill/>
+          <a:extLst>
+            <a:ext uri="{909E8E84-426E-40DD-AFC4-6F175D3DCCD1}">
+              <a14:hiddenFill xmlns:a14="http://schemas.microsoft.com/office/drawing/2010/main">
+                <a:solidFill>
+                  <a:srgbClr val="FFFFFF"/>
+                </a:solidFill>
+              </a14:hiddenFill>
+            </a:ext>
+          </a:extLst>
+        </p:spPr>
+      </p:pic>
+      <p:sp>
+        <p:nvSpPr>
+          <p:cNvPr id="4" name="Content Placeholder 2"/>
           <p:cNvSpPr>
             <a:spLocks noGrp="1"/>
           </p:cNvSpPr>
@@ -7423,53 +7421,36 @@
             <p:ph idx="1"/>
           </p:nvPr>
         </p:nvSpPr>
-        <p:spPr/>
-        <p:txBody>
-          <a:bodyPr/>
+        <p:spPr>
+          <a:xfrm>
+            <a:off x="493571" y="5896842"/>
+            <a:ext cx="8229600" cy="680939"/>
+          </a:xfrm>
+        </p:spPr>
+        <p:txBody>
+          <a:bodyPr>
+            <a:normAutofit/>
+          </a:bodyPr>
           <a:lstStyle/>
           <a:p>
             <a:pPr marL="0" indent="0" algn="ctr">
               <a:buNone/>
             </a:pPr>
-            <a:endParaRPr lang="en-GB" dirty="0" smtClean="0">
-              <a:hlinkClick r:id="rId3"/>
-            </a:endParaRPr>
-          </a:p>
-          <a:p>
-            <a:pPr marL="0" indent="0" algn="ctr">
-              <a:buNone/>
-            </a:pPr>
-            <a:endParaRPr lang="en-GB" dirty="0">
-              <a:hlinkClick r:id="rId3"/>
-            </a:endParaRPr>
-          </a:p>
-          <a:p>
-            <a:pPr marL="0" indent="0" algn="ctr">
-              <a:buNone/>
-            </a:pPr>
-            <a:endParaRPr lang="en-GB" dirty="0" smtClean="0">
-              <a:hlinkClick r:id="rId3"/>
-            </a:endParaRPr>
-          </a:p>
-          <a:p>
-            <a:pPr marL="0" indent="0" algn="ctr">
-              <a:buNone/>
-            </a:pPr>
             <a:r>
               <a:rPr lang="en-GB" dirty="0" smtClean="0">
-                <a:hlinkClick r:id="rId3"/>
+                <a:hlinkClick r:id="rId4"/>
               </a:rPr>
               <a:t>https</a:t>
             </a:r>
             <a:r>
               <a:rPr lang="en-GB" dirty="0">
-                <a:hlinkClick r:id="rId3"/>
+                <a:hlinkClick r:id="rId4"/>
               </a:rPr>
               <a:t>://</a:t>
             </a:r>
             <a:r>
               <a:rPr lang="en-GB" dirty="0" smtClean="0">
-                <a:hlinkClick r:id="rId3"/>
+                <a:hlinkClick r:id="rId4"/>
               </a:rPr>
               <a:t>github.com/gsabev/ista2014</a:t>
             </a:r>
@@ -7486,13 +7467,21 @@
     </p:spTree>
     <p:extLst>
       <p:ext uri="{BB962C8B-B14F-4D97-AF65-F5344CB8AC3E}">
-        <p14:creationId xmlns:p14="http://schemas.microsoft.com/office/powerpoint/2010/main" val="3720358476"/>
+        <p14:creationId xmlns:p14="http://schemas.microsoft.com/office/powerpoint/2010/main" val="3208172370"/>
       </p:ext>
     </p:extLst>
   </p:cSld>
   <p:clrMapOvr>
     <a:masterClrMapping/>
   </p:clrMapOvr>
+  <mc:AlternateContent xmlns:mc="http://schemas.openxmlformats.org/markup-compatibility/2006" xmlns:p14="http://schemas.microsoft.com/office/powerpoint/2010/main">
+    <mc:Choice Requires="p14">
+      <p:transition spd="slow" p14:dur="2000"/>
+    </mc:Choice>
+    <mc:Fallback xmlns="">
+      <p:transition spd="slow"/>
+    </mc:Fallback>
+  </mc:AlternateContent>
   <p:timing>
     <p:tnLst>
       <p:par>
@@ -7709,6 +7698,118 @@
       </p:par>
     </p:tnLst>
   </p:timing>
+</p:sld>
+</file>
+
+<file path=ppt/slides/slide18.xml><?xml version="1.0" encoding="utf-8"?>
+<p:sld xmlns:a="http://schemas.openxmlformats.org/drawingml/2006/main" xmlns:r="http://schemas.openxmlformats.org/officeDocument/2006/relationships" xmlns:p="http://schemas.openxmlformats.org/presentationml/2006/main">
+  <p:cSld>
+    <p:spTree>
+      <p:nvGrpSpPr>
+        <p:cNvPr id="1" name=""/>
+        <p:cNvGrpSpPr/>
+        <p:nvPr/>
+      </p:nvGrpSpPr>
+      <p:grpSpPr>
+        <a:xfrm>
+          <a:off x="0" y="0"/>
+          <a:ext cx="0" cy="0"/>
+          <a:chOff x="0" y="0"/>
+          <a:chExt cx="0" cy="0"/>
+        </a:xfrm>
+      </p:grpSpPr>
+      <p:sp>
+        <p:nvSpPr>
+          <p:cNvPr id="2" name="Title 1"/>
+          <p:cNvSpPr>
+            <a:spLocks noGrp="1"/>
+          </p:cNvSpPr>
+          <p:nvPr>
+            <p:ph type="title"/>
+          </p:nvPr>
+        </p:nvSpPr>
+        <p:spPr/>
+        <p:txBody>
+          <a:bodyPr/>
+          <a:lstStyle/>
+          <a:p>
+            <a:r>
+              <a:rPr lang="en-US" dirty="0" smtClean="0"/>
+              <a:t>Contacts</a:t>
+            </a:r>
+            <a:endParaRPr lang="en-GB" dirty="0"/>
+          </a:p>
+        </p:txBody>
+      </p:sp>
+      <p:sp>
+        <p:nvSpPr>
+          <p:cNvPr id="3" name="Content Placeholder 2"/>
+          <p:cNvSpPr>
+            <a:spLocks noGrp="1"/>
+          </p:cNvSpPr>
+          <p:nvPr>
+            <p:ph idx="1"/>
+          </p:nvPr>
+        </p:nvSpPr>
+        <p:spPr/>
+        <p:txBody>
+          <a:bodyPr anchor="ctr"/>
+          <a:lstStyle/>
+          <a:p>
+            <a:pPr marL="0" indent="0" algn="ctr">
+              <a:buNone/>
+            </a:pPr>
+            <a:r>
+              <a:rPr lang="en-US" dirty="0" smtClean="0">
+                <a:hlinkClick r:id="rId2"/>
+              </a:rPr>
+              <a:t>georgi.sabev@sap.com</a:t>
+            </a:r>
+            <a:r>
+              <a:rPr lang="en-US" dirty="0" smtClean="0"/>
+              <a:t> </a:t>
+            </a:r>
+          </a:p>
+          <a:p>
+            <a:pPr marL="0" indent="0" algn="ctr">
+              <a:buNone/>
+            </a:pPr>
+            <a:r>
+              <a:rPr lang="en-US" dirty="0" smtClean="0">
+                <a:hlinkClick r:id="rId3"/>
+              </a:rPr>
+              <a:t>hristo.iliev@sap.com</a:t>
+            </a:r>
+            <a:endParaRPr lang="en-US" dirty="0" smtClean="0"/>
+          </a:p>
+          <a:p>
+            <a:pPr marL="0" indent="0" algn="ctr">
+              <a:buNone/>
+            </a:pPr>
+            <a:r>
+              <a:rPr lang="en-US" dirty="0" smtClean="0">
+                <a:hlinkClick r:id="rId4"/>
+              </a:rPr>
+              <a:t>ivan.ivanov@sap.com</a:t>
+            </a:r>
+            <a:r>
+              <a:rPr lang="en-US" dirty="0" smtClean="0"/>
+              <a:t> </a:t>
+            </a:r>
+            <a:endParaRPr lang="en-GB" dirty="0"/>
+          </a:p>
+        </p:txBody>
+      </p:sp>
+    </p:spTree>
+    <p:extLst>
+      <p:ext uri="{BB962C8B-B14F-4D97-AF65-F5344CB8AC3E}">
+        <p14:creationId xmlns:p14="http://schemas.microsoft.com/office/powerpoint/2010/main" val="854250328"/>
+      </p:ext>
+    </p:extLst>
+  </p:cSld>
+  <p:clrMapOvr>
+    <a:masterClrMapping/>
+  </p:clrMapOvr>
 </p:sld>
 </file>
 
@@ -9983,13 +10084,8 @@
             </a:r>
             <a:r>
               <a:rPr lang="en-US" i="1" dirty="0" smtClean="0"/>
-              <a:t>size</a:t>
-            </a:r>
-            <a:r>
-              <a:rPr lang="en-US" i="1" dirty="0" smtClean="0"/>
-              <a:t>, add,</a:t>
-            </a:r>
-            <a:endParaRPr lang="en-US" i="1" dirty="0" smtClean="0"/>
+              <a:t>size, add,</a:t>
+            </a:r>
           </a:p>
           <a:p>
             <a:pPr marL="457200" lvl="1" indent="0">
@@ -10177,11 +10273,11 @@
   <p:clrMapOvr>
     <a:masterClrMapping/>
   </p:clrMapOvr>
-  <mc:AlternateContent xmlns:mc="http://schemas.openxmlformats.org/markup-compatibility/2006">
-    <mc:Choice xmlns:p14="http://schemas.microsoft.com/office/powerpoint/2010/main" Requires="p14">
+  <mc:AlternateContent xmlns:mc="http://schemas.openxmlformats.org/markup-compatibility/2006" xmlns:p14="http://schemas.microsoft.com/office/powerpoint/2010/main">
+    <mc:Choice Requires="p14">
       <p:transition spd="slow" p14:dur="2000"/>
     </mc:Choice>
-    <mc:Fallback>
+    <mc:Fallback xmlns="">
       <p:transition spd="slow"/>
     </mc:Fallback>
   </mc:AlternateContent>
@@ -10269,7 +10365,6 @@
               <a:rPr lang="en-US" dirty="0" smtClean="0"/>
               <a:t>What’s left?</a:t>
             </a:r>
-            <a:endParaRPr lang="en-US" dirty="0" smtClean="0"/>
           </a:p>
           <a:p>
             <a:pPr lvl="1"/>
@@ -10286,11 +10381,7 @@
             <a:pPr lvl="1"/>
             <a:r>
               <a:rPr lang="en-US" i="1" dirty="0" smtClean="0"/>
-              <a:t>c</a:t>
-            </a:r>
-            <a:r>
-              <a:rPr lang="en-US" i="1" dirty="0" smtClean="0"/>
-              <a:t>ontains</a:t>
+              <a:t>contains</a:t>
             </a:r>
           </a:p>
           <a:p>
@@ -10306,7 +10397,6 @@
               <a:rPr lang="en-US" i="1" dirty="0" smtClean="0"/>
               <a:t>remove</a:t>
             </a:r>
-            <a:endParaRPr lang="en-US" i="1" dirty="0" smtClean="0"/>
           </a:p>
           <a:p>
             <a:pPr marL="914400" lvl="2" indent="0">

</xml_diff>